<commit_message>
Visualization and analysis update
</commit_message>
<xml_diff>
--- a/research_question_presentation_A113.pptx
+++ b/research_question_presentation_A113.pptx
@@ -4194,7 +4194,7 @@
               <a:t>There are 9</a:t>
             </a:r>
             <a:r>
-              <a:rPr lang="" altLang="en-US" dirty="0"/>
+              <a:rPr lang="en-US" altLang="en-US" dirty="0"/>
               <a:t>2</a:t>
             </a:r>
             <a:r>
@@ -4325,7 +4325,7 @@
               <a:rPr lang="en-GB" dirty="0"/>
               <a:t>Our Research Question is </a:t>
             </a:r>
-            <a:endParaRPr lang="en-GB" dirty="0"/>
+            <a:endParaRPr lang="en-GB" b="0" dirty="0"/>
           </a:p>
           <a:p>
             <a:pPr>
@@ -4342,8 +4342,34 @@
               </a:spcAft>
             </a:pPr>
             <a:r>
-              <a:rPr lang="en-GB" b="0" dirty="0"/>
-              <a:t>"Is there a correlation between time (from October 2012 to September 2013) and the average fund allocation across states?"</a:t>
+              <a:rPr lang="en-GB" b="0" dirty="0">
+                <a:sym typeface="+mn-ea"/>
+              </a:rPr>
+              <a:t>"Is there a correlation between time </a:t>
+            </a:r>
+            <a:r>
+              <a:rPr lang="en-US" altLang="en-GB" b="0" dirty="0">
+                <a:sym typeface="+mn-ea"/>
+              </a:rPr>
+              <a:t>(Independent variable)</a:t>
+            </a:r>
+            <a:r>
+              <a:rPr lang="en-GB" b="0" dirty="0">
+                <a:sym typeface="+mn-ea"/>
+              </a:rPr>
+              <a:t>(from October 2012 to September 2013) and the average fund </a:t>
+            </a:r>
+            <a:r>
+              <a:rPr lang="en-US" altLang="en-GB" b="0" dirty="0">
+                <a:sym typeface="+mn-ea"/>
+              </a:rPr>
+              <a:t>(Dependent variable)</a:t>
+            </a:r>
+            <a:r>
+              <a:rPr lang="en-GB" b="0" dirty="0">
+                <a:sym typeface="+mn-ea"/>
+              </a:rPr>
+              <a:t>allocation across states?"</a:t>
             </a:r>
             <a:endParaRPr lang="en-GB" b="0" dirty="0"/>
           </a:p>

</xml_diff>

<commit_message>
Implementing Suggestion given in presentation
</commit_message>
<xml_diff>
--- a/research_question_presentation_A113.pptx
+++ b/research_question_presentation_A113.pptx
@@ -4345,33 +4345,29 @@
               <a:rPr lang="en-GB" b="0" dirty="0">
                 <a:sym typeface="+mn-ea"/>
               </a:rPr>
-              <a:t>"Is there a correlation between time </a:t>
-            </a:r>
-            <a:r>
-              <a:rPr lang="en-US" altLang="en-GB" b="0" dirty="0">
+              <a:t>"Is there a correlation</a:t>
+            </a:r>
+            <a:r>
+              <a:rPr b="0" dirty="0">
                 <a:sym typeface="+mn-ea"/>
               </a:rPr>
-              <a:t>(Independent variable)</a:t>
-            </a:r>
-            <a:r>
-              <a:rPr lang="en-GB" b="0" dirty="0">
+              <a:t> in the </a:t>
+            </a:r>
+            <a:r>
+              <a:rPr lang="" b="0" dirty="0">
                 <a:sym typeface="+mn-ea"/>
               </a:rPr>
-              <a:t>(from October 2012 to September 2013) and the average fund </a:t>
-            </a:r>
-            <a:r>
-              <a:rPr lang="en-US" altLang="en-GB" b="0" dirty="0">
+              <a:t>monthly </a:t>
+            </a:r>
+            <a:r>
+              <a:rPr b="0" dirty="0">
                 <a:sym typeface="+mn-ea"/>
               </a:rPr>
-              <a:t>(Dependent variable)</a:t>
-            </a:r>
-            <a:r>
-              <a:rPr lang="en-GB" b="0" dirty="0">
-                <a:sym typeface="+mn-ea"/>
-              </a:rPr>
-              <a:t>allocation across states?"</a:t>
-            </a:r>
-            <a:endParaRPr lang="en-GB" b="0" dirty="0"/>
+              <a:t>average fund allocation to postpartum women over the period from October 2012 to September 2013 across all states?"</a:t>
+            </a:r>
+            <a:endParaRPr b="0" dirty="0">
+              <a:sym typeface="+mn-ea"/>
+            </a:endParaRPr>
           </a:p>
         </p:txBody>
       </p:sp>
@@ -4568,7 +4564,27 @@
                 <a:latin typeface="Arial"/>
                 <a:cs typeface="Arial"/>
               </a:rPr>
-              <a:t>"There is no correlation between time (from October 2012 to September 2013) and the average fund allocation across states."</a:t>
+              <a:t>"There is no correlation between time (October 2012 to September 2013) and the </a:t>
+            </a:r>
+            <a:r>
+              <a:rPr lang="" altLang="en-GB" sz="2800" b="0" dirty="0">
+                <a:solidFill>
+                  <a:schemeClr val="tx1"/>
+                </a:solidFill>
+                <a:latin typeface="Arial"/>
+                <a:cs typeface="Arial"/>
+              </a:rPr>
+              <a:t>monthly </a:t>
+            </a:r>
+            <a:r>
+              <a:rPr lang="en-GB" sz="2800" b="0" dirty="0">
+                <a:solidFill>
+                  <a:schemeClr val="tx1"/>
+                </a:solidFill>
+                <a:latin typeface="Arial"/>
+                <a:cs typeface="Arial"/>
+              </a:rPr>
+              <a:t>average fund allocation to postpartum women."</a:t>
             </a:r>
             <a:endParaRPr lang="en-GB" sz="2800" dirty="0">
               <a:solidFill>
@@ -4602,7 +4618,27 @@
                 <a:latin typeface="Arial"/>
                 <a:cs typeface="Arial"/>
               </a:rPr>
-              <a:t>"There is a correlation between time (from October 2012 to September 2013) and the average fund allocation across states."</a:t>
+              <a:t>"There is a correlation between time (October 2012 to September 2013) and the </a:t>
+            </a:r>
+            <a:r>
+              <a:rPr lang="" altLang="en-GB" sz="2800" b="0" dirty="0">
+                <a:solidFill>
+                  <a:schemeClr val="tx1"/>
+                </a:solidFill>
+                <a:latin typeface="Arial"/>
+                <a:cs typeface="Arial"/>
+              </a:rPr>
+              <a:t>monthly</a:t>
+            </a:r>
+            <a:r>
+              <a:rPr lang="en-GB" sz="2800" b="0" dirty="0">
+                <a:solidFill>
+                  <a:schemeClr val="tx1"/>
+                </a:solidFill>
+                <a:latin typeface="Arial"/>
+                <a:cs typeface="Arial"/>
+              </a:rPr>
+              <a:t> average fund allocation to postpartum women."</a:t>
             </a:r>
             <a:endParaRPr lang="en-GB" sz="2800" b="0" dirty="0">
               <a:solidFill>

</xml_diff>